<commit_message>
end of video 35
</commit_message>
<xml_diff>
--- a/static_in_pro/our_static/img/logo.pptx
+++ b/static_in_pro/our_static/img/logo.pptx
@@ -104,6 +104,11 @@
       </a:defRPr>
     </a:lvl9pPr>
   </p:defaultTextStyle>
+  <p:extLst>
+    <p:ext uri="{EFAFB233-063F-42B5-8137-9DF3F51BA10A}">
+      <p15:sldGuideLst xmlns:p15="http://schemas.microsoft.com/office/powerpoint/2012/main"/>
+    </p:ext>
+  </p:extLst>
 </p:presentation>
 </file>
 
@@ -3202,7 +3207,7 @@
             <a:solidFill>
               <a:srgbClr val="A0CA7C"/>
             </a:solidFill>
-            <a:ln>
+            <a:ln w="381000" cmpd="sng">
               <a:noFill/>
             </a:ln>
           </p:spPr>
@@ -3239,7 +3244,7 @@
           </p:nvSpPr>
           <p:spPr>
             <a:xfrm>
-              <a:off x="2825658" y="3342751"/>
+              <a:off x="2884957" y="3354360"/>
               <a:ext cx="522000" cy="523049"/>
             </a:xfrm>
             <a:prstGeom prst="ellipse">

</xml_diff>